<commit_message>
update slide and add HR data
</commit_message>
<xml_diff>
--- a/DSI Tableau.pptx
+++ b/DSI Tableau.pptx
@@ -5800,8 +5800,8 @@
         <a:lstStyle/>
         <a:p>
           <a:r>
-            <a:rPr lang="en-US"/>
-            <a:t>Hate Crime Data</a:t>
+            <a:rPr lang="en-US" dirty="0"/>
+            <a:t>Data</a:t>
           </a:r>
         </a:p>
       </dgm:t>
@@ -8639,8 +8639,8 @@
             <a:buNone/>
           </a:pPr>
           <a:r>
-            <a:rPr lang="en-US" sz="2400" kern="1200"/>
-            <a:t>Hate Crime Data</a:t>
+            <a:rPr lang="en-US" sz="2400" kern="1200" dirty="0"/>
+            <a:t>Data</a:t>
           </a:r>
         </a:p>
       </dsp:txBody>
@@ -15065,7 +15065,7 @@
           <a:p>
             <a:fld id="{A5C20BB3-3CCB-4FE5-991B-82F6BCB48AF3}" type="datetimeFigureOut">
               <a:rPr lang="en-US" smtClean="0"/>
-              <a:t>10/28/2019</a:t>
+              <a:t>1/12/2020</a:t>
             </a:fld>
             <a:endParaRPr lang="en-US"/>
           </a:p>
@@ -15870,7 +15870,7 @@
           <a:p>
             <a:fld id="{5D6495F3-B757-4FAF-98AA-EDA7D1485485}" type="datetimeFigureOut">
               <a:rPr lang="en-US" smtClean="0"/>
-              <a:t>10/28/2019</a:t>
+              <a:t>1/12/2020</a:t>
             </a:fld>
             <a:endParaRPr lang="en-US"/>
           </a:p>
@@ -16068,7 +16068,7 @@
           <a:p>
             <a:fld id="{5D6495F3-B757-4FAF-98AA-EDA7D1485485}" type="datetimeFigureOut">
               <a:rPr lang="en-US" smtClean="0"/>
-              <a:t>10/28/2019</a:t>
+              <a:t>1/12/2020</a:t>
             </a:fld>
             <a:endParaRPr lang="en-US"/>
           </a:p>
@@ -16276,7 +16276,7 @@
           <a:p>
             <a:fld id="{5D6495F3-B757-4FAF-98AA-EDA7D1485485}" type="datetimeFigureOut">
               <a:rPr lang="en-US" smtClean="0"/>
-              <a:t>10/28/2019</a:t>
+              <a:t>1/12/2020</a:t>
             </a:fld>
             <a:endParaRPr lang="en-US"/>
           </a:p>
@@ -16474,7 +16474,7 @@
           <a:p>
             <a:fld id="{5D6495F3-B757-4FAF-98AA-EDA7D1485485}" type="datetimeFigureOut">
               <a:rPr lang="en-US" smtClean="0"/>
-              <a:t>10/28/2019</a:t>
+              <a:t>1/12/2020</a:t>
             </a:fld>
             <a:endParaRPr lang="en-US"/>
           </a:p>
@@ -16749,7 +16749,7 @@
           <a:p>
             <a:fld id="{5D6495F3-B757-4FAF-98AA-EDA7D1485485}" type="datetimeFigureOut">
               <a:rPr lang="en-US" smtClean="0"/>
-              <a:t>10/28/2019</a:t>
+              <a:t>1/12/2020</a:t>
             </a:fld>
             <a:endParaRPr lang="en-US"/>
           </a:p>
@@ -17014,7 +17014,7 @@
           <a:p>
             <a:fld id="{5D6495F3-B757-4FAF-98AA-EDA7D1485485}" type="datetimeFigureOut">
               <a:rPr lang="en-US" smtClean="0"/>
-              <a:t>10/28/2019</a:t>
+              <a:t>1/12/2020</a:t>
             </a:fld>
             <a:endParaRPr lang="en-US"/>
           </a:p>
@@ -17426,7 +17426,7 @@
           <a:p>
             <a:fld id="{5D6495F3-B757-4FAF-98AA-EDA7D1485485}" type="datetimeFigureOut">
               <a:rPr lang="en-US" smtClean="0"/>
-              <a:t>10/28/2019</a:t>
+              <a:t>1/12/2020</a:t>
             </a:fld>
             <a:endParaRPr lang="en-US"/>
           </a:p>
@@ -17567,7 +17567,7 @@
           <a:p>
             <a:fld id="{5D6495F3-B757-4FAF-98AA-EDA7D1485485}" type="datetimeFigureOut">
               <a:rPr lang="en-US" smtClean="0"/>
-              <a:t>10/28/2019</a:t>
+              <a:t>1/12/2020</a:t>
             </a:fld>
             <a:endParaRPr lang="en-US"/>
           </a:p>
@@ -17680,7 +17680,7 @@
           <a:p>
             <a:fld id="{5D6495F3-B757-4FAF-98AA-EDA7D1485485}" type="datetimeFigureOut">
               <a:rPr lang="en-US" smtClean="0"/>
-              <a:t>10/28/2019</a:t>
+              <a:t>1/12/2020</a:t>
             </a:fld>
             <a:endParaRPr lang="en-US"/>
           </a:p>
@@ -17991,7 +17991,7 @@
           <a:p>
             <a:fld id="{5D6495F3-B757-4FAF-98AA-EDA7D1485485}" type="datetimeFigureOut">
               <a:rPr lang="en-US" smtClean="0"/>
-              <a:t>10/28/2019</a:t>
+              <a:t>1/12/2020</a:t>
             </a:fld>
             <a:endParaRPr lang="en-US"/>
           </a:p>
@@ -18282,7 +18282,7 @@
           <a:p>
             <a:fld id="{5D6495F3-B757-4FAF-98AA-EDA7D1485485}" type="datetimeFigureOut">
               <a:rPr lang="en-US" smtClean="0"/>
-              <a:t>10/28/2019</a:t>
+              <a:t>1/12/2020</a:t>
             </a:fld>
             <a:endParaRPr lang="en-US"/>
           </a:p>
@@ -18523,7 +18523,7 @@
           <a:p>
             <a:fld id="{5D6495F3-B757-4FAF-98AA-EDA7D1485485}" type="datetimeFigureOut">
               <a:rPr lang="en-US" smtClean="0"/>
-              <a:t>10/28/2019</a:t>
+              <a:t>1/12/2020</a:t>
             </a:fld>
             <a:endParaRPr lang="en-US"/>
           </a:p>
@@ -22202,7 +22202,7 @@
             <p:ph idx="1"/>
             <p:extLst>
               <p:ext uri="{D42A27DB-BD31-4B8C-83A1-F6EECF244321}">
-                <p14:modId xmlns:p14="http://schemas.microsoft.com/office/powerpoint/2010/main" val="1788392836"/>
+                <p14:modId xmlns:p14="http://schemas.microsoft.com/office/powerpoint/2010/main" val="2943909290"/>
               </p:ext>
             </p:extLst>
           </p:nvPr>

</xml_diff>